<commit_message>
Change monthly results according to the new scenario version
</commit_message>
<xml_diff>
--- a/data_and_results/!Reports/monthly reports/2099.02 - wyniki/02.2099 - raport finansowy.pptx
+++ b/data_and_results/!Reports/monthly reports/2099.02 - wyniki/02.2099 - raport finansowy.pptx
@@ -13,7 +13,6 @@
     <p:sldId id="261" r:id="rId12"/>
     <p:sldId id="262" r:id="rId13"/>
     <p:sldId id="263" r:id="rId14"/>
-    <p:sldId id="264" r:id="rId15"/>
   </p:sldIdLst>
   <p:sldSz cx="9144000" cy="6858000" type="screen4x3"/>
   <p:notesSz cx="6858000" cy="9144000"/>
@@ -3172,8 +3171,8 @@
         </p:blipFill>
         <p:spPr>
           <a:xfrm>
-            <a:off x="1371600" y="0"/>
-            <a:ext cx="6858000" cy="6858000"/>
+            <a:off x="457200" y="0"/>
+            <a:ext cx="8229600" cy="6858000"/>
           </a:xfrm>
           <a:prstGeom prst="rect">
             <a:avLst/>
@@ -3214,8 +3213,8 @@
         </p:blipFill>
         <p:spPr>
           <a:xfrm>
-            <a:off x="1371600" y="0"/>
-            <a:ext cx="6858000" cy="6858000"/>
+            <a:off x="457200" y="0"/>
+            <a:ext cx="8229600" cy="6858000"/>
           </a:xfrm>
           <a:prstGeom prst="rect">
             <a:avLst/>
@@ -3256,8 +3255,8 @@
         </p:blipFill>
         <p:spPr>
           <a:xfrm>
-            <a:off x="1371600" y="0"/>
-            <a:ext cx="6858000" cy="6858000"/>
+            <a:off x="457200" y="0"/>
+            <a:ext cx="8229600" cy="6858000"/>
           </a:xfrm>
           <a:prstGeom prst="rect">
             <a:avLst/>
@@ -3298,8 +3297,8 @@
         </p:blipFill>
         <p:spPr>
           <a:xfrm>
-            <a:off x="1371600" y="0"/>
-            <a:ext cx="6858000" cy="6858000"/>
+            <a:off x="457200" y="0"/>
+            <a:ext cx="8229600" cy="6858000"/>
           </a:xfrm>
           <a:prstGeom prst="rect">
             <a:avLst/>
@@ -3340,8 +3339,8 @@
         </p:blipFill>
         <p:spPr>
           <a:xfrm>
-            <a:off x="1371600" y="0"/>
-            <a:ext cx="6858000" cy="6858000"/>
+            <a:off x="457200" y="0"/>
+            <a:ext cx="8229600" cy="6858000"/>
           </a:xfrm>
           <a:prstGeom prst="rect">
             <a:avLst/>
@@ -3382,8 +3381,8 @@
         </p:blipFill>
         <p:spPr>
           <a:xfrm>
-            <a:off x="1371600" y="0"/>
-            <a:ext cx="6858000" cy="6858000"/>
+            <a:off x="457200" y="0"/>
+            <a:ext cx="8229600" cy="6858000"/>
           </a:xfrm>
           <a:prstGeom prst="rect">
             <a:avLst/>
@@ -3424,50 +3423,8 @@
         </p:blipFill>
         <p:spPr>
           <a:xfrm>
-            <a:off x="1371600" y="0"/>
-            <a:ext cx="6858000" cy="6858000"/>
-          </a:xfrm>
-          <a:prstGeom prst="rect">
-            <a:avLst/>
-          </a:prstGeom>
-        </p:spPr>
-      </p:pic>
-    </p:spTree>
-  </p:cSld>
-  <p:clrMapOvr>
-    <a:masterClrMapping/>
-  </p:clrMapOvr>
-</p:sld>
-</file>
-
-<file path=ppt/slides/slide9.xml><?xml version="1.0" encoding="utf-8"?>
-<p:sld xmlns:a="http://schemas.openxmlformats.org/drawingml/2006/main" xmlns:p="http://schemas.openxmlformats.org/presentationml/2006/main" xmlns:r="http://schemas.openxmlformats.org/officeDocument/2006/relationships">
-  <p:cSld>
-    <p:spTree>
-      <p:nvGrpSpPr>
-        <p:cNvPr id="1" name=""/>
-        <p:cNvGrpSpPr/>
-        <p:nvPr/>
-      </p:nvGrpSpPr>
-      <p:grpSpPr/>
-      <p:pic>
-        <p:nvPicPr>
-          <p:cNvPr id="2" name="Picture 1" descr="plot8.png"/>
-          <p:cNvPicPr>
-            <a:picLocks noChangeAspect="1"/>
-          </p:cNvPicPr>
-          <p:nvPr/>
-        </p:nvPicPr>
-        <p:blipFill>
-          <a:blip r:embed="rId2"/>
-          <a:stretch>
-            <a:fillRect/>
-          </a:stretch>
-        </p:blipFill>
-        <p:spPr>
-          <a:xfrm>
-            <a:off x="1371600" y="0"/>
-            <a:ext cx="6858000" cy="6858000"/>
+            <a:off x="457200" y="0"/>
+            <a:ext cx="8229600" cy="6858000"/>
           </a:xfrm>
           <a:prstGeom prst="rect">
             <a:avLst/>

</xml_diff>